<commit_message>
Unhackable Quantum Code: STEAM Experience 2023
Minor tweaks to template
</commit_message>
<xml_diff>
--- a/STEAM_Summer_2023/STEAM_2023_Poster_Template.pptx
+++ b/STEAM_Summer_2023/STEAM_2023_Poster_Template.pptx
@@ -8326,7 +8326,7 @@
           <a:bodyPr/>
           <a:lstStyle/>
           <a:p>
-            <a:endParaRPr lang="en-US"/>
+            <a:endParaRPr lang="en-US" dirty="0"/>
           </a:p>
         </p:txBody>
       </p:sp>
@@ -8352,7 +8352,7 @@
           <a:lstStyle/>
           <a:p>
             <a:r>
-              <a:rPr lang="en-US"/>
+              <a:rPr lang="en-US" dirty="0"/>
               <a:t>NAME OF AUTHOR(S)</a:t>
             </a:r>
           </a:p>
@@ -8380,8 +8380,12 @@
           <a:lstStyle/>
           <a:p>
             <a:r>
-              <a:rPr lang="en-US"/>
-              <a:t>NAME OF ADVISOR(S)</a:t>
+              <a:rPr lang="en-US" dirty="0" err="1"/>
+              <a:t>Unhackable</a:t>
+            </a:r>
+            <a:r>
+              <a:rPr lang="en-US" dirty="0"/>
+              <a:t> Quantum Code: STEAM Experience 2023</a:t>
             </a:r>
           </a:p>
         </p:txBody>
@@ -15174,7 +15178,7 @@
           <a:bodyPr/>
           <a:lstStyle/>
           <a:p>
-            <a:endParaRPr lang="en-US"/>
+            <a:endParaRPr lang="en-US" dirty="0"/>
           </a:p>
         </p:txBody>
       </p:sp>
@@ -15199,6 +15203,7 @@
           <a:bodyPr/>
           <a:lstStyle/>
           <a:p>
+            <a:pPr algn="ctr"/>
             <a:endParaRPr lang="en-US" dirty="0"/>
           </a:p>
         </p:txBody>
@@ -15224,12 +15229,13 @@
           <a:bodyPr/>
           <a:lstStyle/>
           <a:p>
-            <a:r>
-              <a:rPr lang="en-US" dirty="0" err="1"/>
+            <a:pPr algn="ctr"/>
+            <a:r>
+              <a:rPr lang="en-US" sz="4800" dirty="0" err="1"/>
               <a:t>Unhackable</a:t>
             </a:r>
             <a:r>
-              <a:rPr lang="en-US" dirty="0"/>
+              <a:rPr lang="en-US" sz="4800" dirty="0"/>
               <a:t> Quantum Code: STEAM Experience 2023</a:t>
             </a:r>
           </a:p>
@@ -15256,6 +15262,7 @@
           <a:bodyPr/>
           <a:lstStyle/>
           <a:p>
+            <a:pPr algn="ctr"/>
             <a:endParaRPr lang="en-US" dirty="0"/>
           </a:p>
         </p:txBody>
@@ -15860,28 +15867,6 @@
 </file>
 
 <file path=customXml/item1.xml><?xml version="1.0" encoding="utf-8"?>
-<p:properties xmlns:p="http://schemas.microsoft.com/office/2006/metadata/properties" xmlns:xsi="http://www.w3.org/2001/XMLSchema-instance" xmlns:pc="http://schemas.microsoft.com/office/infopath/2007/PartnerControls">
-  <documentManagement>
-    <TaxCatchAll xmlns="b43a2401-f8d3-41b1-907b-d8144d9a056d" xsi:nil="true"/>
-    <lcf76f155ced4ddcb4097134ff3c332f xmlns="ba7a27fc-dcff-4cb6-a1bd-d3dd078c1546">
-      <Terms xmlns="http://schemas.microsoft.com/office/infopath/2007/PartnerControls"/>
-    </lcf76f155ced4ddcb4097134ff3c332f>
-    <PublishingExpirationDate xmlns="http://schemas.microsoft.com/sharepoint/v3" xsi:nil="true"/>
-    <PublishingStartDate xmlns="http://schemas.microsoft.com/sharepoint/v3" xsi:nil="true"/>
-  </documentManagement>
-</p:properties>
-</file>
-
-<file path=customXml/item2.xml><?xml version="1.0" encoding="utf-8"?>
-<?mso-contentType ?>
-<FormTemplates xmlns="http://schemas.microsoft.com/sharepoint/v3/contenttype/forms">
-  <Display>DocumentLibraryForm</Display>
-  <Edit>DocumentLibraryForm</Edit>
-  <New>DocumentLibraryForm</New>
-</FormTemplates>
-</file>
-
-<file path=customXml/item3.xml><?xml version="1.0" encoding="utf-8"?>
 <ct:contentTypeSchema xmlns:ct="http://schemas.microsoft.com/office/2006/metadata/contentType" xmlns:ma="http://schemas.microsoft.com/office/2006/metadata/properties/metaAttributes" ct:_="" ma:_="" ma:contentTypeName="Document" ma:contentTypeID="0x010100620D55089C03FD4EB788F461F1CD9C4C" ma:contentTypeVersion="6" ma:contentTypeDescription="Create a new document." ma:contentTypeScope="" ma:versionID="ea925a32b2979919820b3d5352055d3f">
   <xsd:schema xmlns:xsd="http://www.w3.org/2001/XMLSchema" xmlns:xs="http://www.w3.org/2001/XMLSchema" xmlns:p="http://schemas.microsoft.com/office/2006/metadata/properties" xmlns:ns1="http://schemas.microsoft.com/sharepoint/v3" xmlns:ns2="f7d152d1-f857-4de6-974e-67acf66ebef3" xmlns:ns3="11fecfb6-7725-4751-8031-1356f71e7068" xmlns:ns4="ba7a27fc-dcff-4cb6-a1bd-d3dd078c1546" xmlns:ns5="b43a2401-f8d3-41b1-907b-d8144d9a056d" targetNamespace="http://schemas.microsoft.com/office/2006/metadata/properties" ma:root="true" ma:fieldsID="fc2421a1773839b1a5ed8e4aec63970b" ns1:_="" ns2:_="" ns3:_="" ns4:_="" ns5:_="">
     <xsd:import namespace="http://schemas.microsoft.com/sharepoint/v3"/>
@@ -16113,29 +16098,29 @@
 </ct:contentTypeSchema>
 </file>
 
-<file path=customXml/itemProps1.xml><?xml version="1.0" encoding="utf-8"?>
-<ds:datastoreItem xmlns:ds="http://schemas.openxmlformats.org/officeDocument/2006/customXml" ds:itemID="{51058B33-7949-493E-A800-2B687D81368C}">
-  <ds:schemaRefs>
-    <ds:schemaRef ds:uri="http://schemas.microsoft.com/office/2006/metadata/properties"/>
-    <ds:schemaRef ds:uri="http://schemas.microsoft.com/office/infopath/2007/PartnerControls"/>
-    <ds:schemaRef ds:uri="b43a2401-f8d3-41b1-907b-d8144d9a056d"/>
-    <ds:schemaRef ds:uri="ba7a27fc-dcff-4cb6-a1bd-d3dd078c1546"/>
-    <ds:schemaRef ds:uri="http://schemas.microsoft.com/sharepoint/v3"/>
-    <ds:schemaRef ds:uri="409fc9c5-ca07-4182-8357-c5b7ae72a8b2"/>
-    <ds:schemaRef ds:uri="3bbb7884-7355-4b07-bb62-eab73771408f"/>
-  </ds:schemaRefs>
-</ds:datastoreItem>
+<file path=customXml/item2.xml><?xml version="1.0" encoding="utf-8"?>
+<?mso-contentType ?>
+<FormTemplates xmlns="http://schemas.microsoft.com/sharepoint/v3/contenttype/forms">
+  <Display>DocumentLibraryForm</Display>
+  <Edit>DocumentLibraryForm</Edit>
+  <New>DocumentLibraryForm</New>
+</FormTemplates>
 </file>
 
-<file path=customXml/itemProps2.xml><?xml version="1.0" encoding="utf-8"?>
-<ds:datastoreItem xmlns:ds="http://schemas.openxmlformats.org/officeDocument/2006/customXml" ds:itemID="{D3AB80AF-7D06-4A35-9D3A-030DB8CC52CA}">
-  <ds:schemaRefs>
-    <ds:schemaRef ds:uri="http://schemas.microsoft.com/sharepoint/v3/contenttype/forms"/>
-  </ds:schemaRefs>
-</ds:datastoreItem>
+<file path=customXml/item3.xml><?xml version="1.0" encoding="utf-8"?>
+<p:properties xmlns:p="http://schemas.microsoft.com/office/2006/metadata/properties" xmlns:xsi="http://www.w3.org/2001/XMLSchema-instance" xmlns:pc="http://schemas.microsoft.com/office/infopath/2007/PartnerControls">
+  <documentManagement>
+    <TaxCatchAll xmlns="b43a2401-f8d3-41b1-907b-d8144d9a056d" xsi:nil="true"/>
+    <lcf76f155ced4ddcb4097134ff3c332f xmlns="ba7a27fc-dcff-4cb6-a1bd-d3dd078c1546">
+      <Terms xmlns="http://schemas.microsoft.com/office/infopath/2007/PartnerControls"/>
+    </lcf76f155ced4ddcb4097134ff3c332f>
+    <PublishingExpirationDate xmlns="http://schemas.microsoft.com/sharepoint/v3" xsi:nil="true"/>
+    <PublishingStartDate xmlns="http://schemas.microsoft.com/sharepoint/v3" xsi:nil="true"/>
+  </documentManagement>
+</p:properties>
 </file>
 
-<file path=customXml/itemProps3.xml><?xml version="1.0" encoding="utf-8"?>
+<file path=customXml/itemProps1.xml><?xml version="1.0" encoding="utf-8"?>
 <ds:datastoreItem xmlns:ds="http://schemas.openxmlformats.org/officeDocument/2006/customXml" ds:itemID="{92D09A32-4064-4898-A388-F752CC6E4C00}">
   <ds:schemaRefs>
     <ds:schemaRef ds:uri="http://schemas.microsoft.com/office/2006/metadata/contentType"/>
@@ -16155,4 +16140,26 @@
     <ds:schemaRef ds:uri="http://schemas.microsoft.com/internal/obd"/>
   </ds:schemaRefs>
 </ds:datastoreItem>
+</file>
+
+<file path=customXml/itemProps2.xml><?xml version="1.0" encoding="utf-8"?>
+<ds:datastoreItem xmlns:ds="http://schemas.openxmlformats.org/officeDocument/2006/customXml" ds:itemID="{D3AB80AF-7D06-4A35-9D3A-030DB8CC52CA}">
+  <ds:schemaRefs>
+    <ds:schemaRef ds:uri="http://schemas.microsoft.com/sharepoint/v3/contenttype/forms"/>
+  </ds:schemaRefs>
+</ds:datastoreItem>
+</file>
+
+<file path=customXml/itemProps3.xml><?xml version="1.0" encoding="utf-8"?>
+<ds:datastoreItem xmlns:ds="http://schemas.openxmlformats.org/officeDocument/2006/customXml" ds:itemID="{51058B33-7949-493E-A800-2B687D81368C}">
+  <ds:schemaRefs>
+    <ds:schemaRef ds:uri="http://schemas.microsoft.com/office/2006/metadata/properties"/>
+    <ds:schemaRef ds:uri="http://schemas.microsoft.com/office/infopath/2007/PartnerControls"/>
+    <ds:schemaRef ds:uri="b43a2401-f8d3-41b1-907b-d8144d9a056d"/>
+    <ds:schemaRef ds:uri="ba7a27fc-dcff-4cb6-a1bd-d3dd078c1546"/>
+    <ds:schemaRef ds:uri="http://schemas.microsoft.com/sharepoint/v3"/>
+    <ds:schemaRef ds:uri="409fc9c5-ca07-4182-8357-c5b7ae72a8b2"/>
+    <ds:schemaRef ds:uri="3bbb7884-7355-4b07-bb62-eab73771408f"/>
+  </ds:schemaRefs>
+</ds:datastoreItem>
 </file>
</xml_diff>